<commit_message>
Demo Video added to PPT
</commit_message>
<xml_diff>
--- a/PESU_E&C_4th_Sem_data_transfer_with_ultrasonic v2.pptx
+++ b/PESU_E&C_4th_Sem_data_transfer_with_ultrasonic v2.pptx
@@ -16102,38 +16102,6 @@
       </p:sp>
       <p:sp>
         <p:nvSpPr>
-          <p:cNvPr id="3" name="Content Placeholder 2">
-            <a:extLst>
-              <a:ext uri="{FF2B5EF4-FFF2-40B4-BE49-F238E27FC236}">
-                <a16:creationId xmlns:a16="http://schemas.microsoft.com/office/drawing/2014/main" id="{D4055870-0D80-4702-9C9E-CC21838FC8EC}"/>
-              </a:ext>
-            </a:extLst>
-          </p:cNvPr>
-          <p:cNvSpPr>
-            <a:spLocks noGrp="1"/>
-          </p:cNvSpPr>
-          <p:nvPr>
-            <p:ph idx="1"/>
-          </p:nvPr>
-        </p:nvSpPr>
-        <p:spPr>
-          <a:xfrm>
-            <a:off x="250368" y="1231641"/>
-            <a:ext cx="11699893" cy="4803516"/>
-          </a:xfrm>
-        </p:spPr>
-        <p:txBody>
-          <a:bodyPr>
-            <a:normAutofit/>
-          </a:bodyPr>
-          <a:lstStyle/>
-          <a:p>
-            <a:endParaRPr lang="en-IN" sz="2400" dirty="0"/>
-          </a:p>
-        </p:txBody>
-      </p:sp>
-      <p:sp>
-        <p:nvSpPr>
           <p:cNvPr id="5" name="Slide Number Placeholder 4">
             <a:extLst>
               <a:ext uri="{FF2B5EF4-FFF2-40B4-BE49-F238E27FC236}">
@@ -16545,43 +16513,46 @@
             <a:pPr algn="ctr"/>
             <a:r>
               <a:rPr lang="en-US" dirty="0"/>
-              <a:t>Results</a:t>
+              <a:t>Demo Video</a:t>
             </a:r>
           </a:p>
         </p:txBody>
       </p:sp>
-      <p:sp>
-        <p:nvSpPr>
-          <p:cNvPr id="3" name="Content Placeholder 2">
+      <p:pic>
+        <p:nvPicPr>
+          <p:cNvPr id="4" name="Output_Waveform">
+            <a:hlinkClick r:id="" action="ppaction://media"/>
             <a:extLst>
               <a:ext uri="{FF2B5EF4-FFF2-40B4-BE49-F238E27FC236}">
-                <a16:creationId xmlns:a16="http://schemas.microsoft.com/office/drawing/2014/main" id="{D4055870-0D80-4702-9C9E-CC21838FC8EC}"/>
+                <a16:creationId xmlns:a16="http://schemas.microsoft.com/office/drawing/2014/main" id="{BA1DE29D-9CE0-4A82-AF02-CF04AACF4CD3}"/>
               </a:ext>
             </a:extLst>
           </p:cNvPr>
-          <p:cNvSpPr>
-            <a:spLocks noGrp="1"/>
-          </p:cNvSpPr>
+          <p:cNvPicPr>
+            <a:picLocks noGrp="1" noChangeAspect="1"/>
+          </p:cNvPicPr>
           <p:nvPr>
             <p:ph idx="1"/>
+            <a:videoFile r:link="rId2"/>
+            <p:extLst>
+              <p:ext uri="{DAA4B4D4-6D71-4841-9C94-3DE7FCFB9230}">
+                <p14:media xmlns:p14="http://schemas.microsoft.com/office/powerpoint/2010/main" r:embed="rId1"/>
+              </p:ext>
+            </p:extLst>
           </p:nvPr>
-        </p:nvSpPr>
+        </p:nvPicPr>
+        <p:blipFill rotWithShape="1">
+          <a:blip r:embed="rId5"/>
+          <a:srcRect l="3439" t="9468" r="7060"/>
+          <a:stretch/>
+        </p:blipFill>
         <p:spPr>
           <a:xfrm>
-            <a:off x="250369" y="1231641"/>
-            <a:ext cx="10515600" cy="4803516"/>
+            <a:off x="1512505" y="1036153"/>
+            <a:ext cx="9156479" cy="5209500"/>
           </a:xfrm>
         </p:spPr>
-        <p:txBody>
-          <a:bodyPr>
-            <a:normAutofit/>
-          </a:bodyPr>
-          <a:lstStyle/>
-          <a:p>
-            <a:endParaRPr lang="en-IN" sz="2400" dirty="0"/>
-          </a:p>
-        </p:txBody>
-      </p:sp>
+      </p:pic>
       <p:sp>
         <p:nvSpPr>
           <p:cNvPr id="5" name="Slide Number Placeholder 4">
@@ -16655,7 +16626,7 @@
           <p:nvPr/>
         </p:nvPicPr>
         <p:blipFill rotWithShape="1">
-          <a:blip r:embed="rId3">
+          <a:blip r:embed="rId6">
             <a:extLst>
               <a:ext uri="{28A0092B-C50C-407E-A947-70E740481C1C}">
                 <a14:useLocalDpi xmlns:a14="http://schemas.microsoft.com/office/drawing/2010/main" val="0"/>
@@ -16690,7 +16661,7 @@
           <p:nvPr/>
         </p:nvPicPr>
         <p:blipFill>
-          <a:blip r:embed="rId4">
+          <a:blip r:embed="rId7">
             <a:extLst>
               <a:ext uri="{28A0092B-C50C-407E-A947-70E740481C1C}">
                 <a14:useLocalDpi xmlns:a14="http://schemas.microsoft.com/office/drawing/2010/main" val="0"/>
@@ -16721,6 +16692,144 @@
   <p:clrMapOvr>
     <a:masterClrMapping/>
   </p:clrMapOvr>
+  <p:timing>
+    <p:tnLst>
+      <p:par>
+        <p:cTn id="1" dur="indefinite" restart="never" nodeType="tmRoot">
+          <p:childTnLst>
+            <p:seq concurrent="1" nextAc="seek">
+              <p:cTn id="2" dur="indefinite" nodeType="mainSeq">
+                <p:childTnLst>
+                  <p:par>
+                    <p:cTn id="3" fill="hold">
+                      <p:stCondLst>
+                        <p:cond delay="indefinite"/>
+                        <p:cond evt="onBegin" delay="0">
+                          <p:tn val="2"/>
+                        </p:cond>
+                      </p:stCondLst>
+                      <p:childTnLst>
+                        <p:par>
+                          <p:cTn id="4" fill="hold">
+                            <p:stCondLst>
+                              <p:cond delay="0"/>
+                            </p:stCondLst>
+                            <p:childTnLst>
+                              <p:par>
+                                <p:cTn id="5" presetID="1" presetClass="mediacall" presetSubtype="0" fill="hold" nodeType="afterEffect">
+                                  <p:stCondLst>
+                                    <p:cond delay="0"/>
+                                  </p:stCondLst>
+                                  <p:childTnLst>
+                                    <p:cmd type="call" cmd="playFrom(0.0)">
+                                      <p:cBhvr>
+                                        <p:cTn id="6" dur="8731" fill="hold"/>
+                                        <p:tgtEl>
+                                          <p:spTgt spid="4"/>
+                                        </p:tgtEl>
+                                      </p:cBhvr>
+                                    </p:cmd>
+                                  </p:childTnLst>
+                                </p:cTn>
+                              </p:par>
+                            </p:childTnLst>
+                          </p:cTn>
+                        </p:par>
+                      </p:childTnLst>
+                    </p:cTn>
+                  </p:par>
+                </p:childTnLst>
+              </p:cTn>
+              <p:prevCondLst>
+                <p:cond evt="onPrev" delay="0">
+                  <p:tgtEl>
+                    <p:sldTgt/>
+                  </p:tgtEl>
+                </p:cond>
+              </p:prevCondLst>
+              <p:nextCondLst>
+                <p:cond evt="onNext" delay="0">
+                  <p:tgtEl>
+                    <p:sldTgt/>
+                  </p:tgtEl>
+                </p:cond>
+              </p:nextCondLst>
+            </p:seq>
+            <p:video>
+              <p:cMediaNode vol="80000" mute="1">
+                <p:cTn id="7" repeatCount="indefinite" fill="hold" display="0">
+                  <p:stCondLst>
+                    <p:cond delay="indefinite"/>
+                  </p:stCondLst>
+                </p:cTn>
+                <p:tgtEl>
+                  <p:spTgt spid="4"/>
+                </p:tgtEl>
+              </p:cMediaNode>
+            </p:video>
+            <p:seq concurrent="1" nextAc="seek">
+              <p:cTn id="8" restart="whenNotActive" fill="hold" evtFilter="cancelBubble" nodeType="interactiveSeq">
+                <p:stCondLst>
+                  <p:cond evt="onClick" delay="0">
+                    <p:tgtEl>
+                      <p:spTgt spid="4"/>
+                    </p:tgtEl>
+                  </p:cond>
+                </p:stCondLst>
+                <p:endSync evt="end" delay="0">
+                  <p:rtn val="all"/>
+                </p:endSync>
+                <p:childTnLst>
+                  <p:par>
+                    <p:cTn id="9" fill="hold">
+                      <p:stCondLst>
+                        <p:cond delay="0"/>
+                      </p:stCondLst>
+                      <p:childTnLst>
+                        <p:par>
+                          <p:cTn id="10" fill="hold">
+                            <p:stCondLst>
+                              <p:cond delay="0"/>
+                            </p:stCondLst>
+                            <p:childTnLst>
+                              <p:par>
+                                <p:cTn id="11" presetID="2" presetClass="mediacall" presetSubtype="0" fill="hold" nodeType="clickEffect">
+                                  <p:stCondLst>
+                                    <p:cond delay="0"/>
+                                  </p:stCondLst>
+                                  <p:childTnLst>
+                                    <p:cmd type="call" cmd="togglePause">
+                                      <p:cBhvr>
+                                        <p:cTn id="12" dur="1" fill="hold"/>
+                                        <p:tgtEl>
+                                          <p:spTgt spid="4"/>
+                                        </p:tgtEl>
+                                      </p:cBhvr>
+                                    </p:cmd>
+                                  </p:childTnLst>
+                                </p:cTn>
+                              </p:par>
+                            </p:childTnLst>
+                          </p:cTn>
+                        </p:par>
+                      </p:childTnLst>
+                    </p:cTn>
+                  </p:par>
+                </p:childTnLst>
+              </p:cTn>
+              <p:nextCondLst>
+                <p:cond evt="onClick" delay="0">
+                  <p:tgtEl>
+                    <p:spTgt spid="4"/>
+                  </p:tgtEl>
+                </p:cond>
+              </p:nextCondLst>
+            </p:seq>
+          </p:childTnLst>
+        </p:cTn>
+      </p:par>
+    </p:tnLst>
+  </p:timing>
 </p:sld>
 </file>
 

</xml_diff>